<commit_message>
update presentation and fix backend_url fetch
</commit_message>
<xml_diff>
--- a/solution/Presentation.pptx
+++ b/solution/Presentation.pptx
@@ -108,6 +108,11 @@
       </a:defRPr>
     </a:lvl9pPr>
   </p:defaultTextStyle>
+  <p:extLst>
+    <p:ext uri="{EFAFB233-063F-42B5-8137-9DF3F51BA10A}">
+      <p15:sldGuideLst xmlns:p15="http://schemas.microsoft.com/office/powerpoint/2012/main"/>
+    </p:ext>
+  </p:extLst>
 </p:presentation>
 </file>
 
@@ -258,7 +263,7 @@
           <a:p>
             <a:fld id="{AE0197F4-4DF5-4E28-8B21-1CA74B1952A3}" type="datetimeFigureOut">
               <a:rPr lang="en-US" smtClean="0"/>
-              <a:t>2/4/2022</a:t>
+              <a:t>2/12/2022</a:t>
             </a:fld>
             <a:endParaRPr lang="en-US"/>
           </a:p>
@@ -456,7 +461,7 @@
           <a:p>
             <a:fld id="{AE0197F4-4DF5-4E28-8B21-1CA74B1952A3}" type="datetimeFigureOut">
               <a:rPr lang="en-US" smtClean="0"/>
-              <a:t>2/4/2022</a:t>
+              <a:t>2/12/2022</a:t>
             </a:fld>
             <a:endParaRPr lang="en-US"/>
           </a:p>
@@ -664,7 +669,7 @@
           <a:p>
             <a:fld id="{AE0197F4-4DF5-4E28-8B21-1CA74B1952A3}" type="datetimeFigureOut">
               <a:rPr lang="en-US" smtClean="0"/>
-              <a:t>2/4/2022</a:t>
+              <a:t>2/12/2022</a:t>
             </a:fld>
             <a:endParaRPr lang="en-US"/>
           </a:p>
@@ -862,7 +867,7 @@
           <a:p>
             <a:fld id="{AE0197F4-4DF5-4E28-8B21-1CA74B1952A3}" type="datetimeFigureOut">
               <a:rPr lang="en-US" smtClean="0"/>
-              <a:t>2/4/2022</a:t>
+              <a:t>2/12/2022</a:t>
             </a:fld>
             <a:endParaRPr lang="en-US"/>
           </a:p>
@@ -1137,7 +1142,7 @@
           <a:p>
             <a:fld id="{AE0197F4-4DF5-4E28-8B21-1CA74B1952A3}" type="datetimeFigureOut">
               <a:rPr lang="en-US" smtClean="0"/>
-              <a:t>2/4/2022</a:t>
+              <a:t>2/12/2022</a:t>
             </a:fld>
             <a:endParaRPr lang="en-US"/>
           </a:p>
@@ -1402,7 +1407,7 @@
           <a:p>
             <a:fld id="{AE0197F4-4DF5-4E28-8B21-1CA74B1952A3}" type="datetimeFigureOut">
               <a:rPr lang="en-US" smtClean="0"/>
-              <a:t>2/4/2022</a:t>
+              <a:t>2/12/2022</a:t>
             </a:fld>
             <a:endParaRPr lang="en-US"/>
           </a:p>
@@ -1814,7 +1819,7 @@
           <a:p>
             <a:fld id="{AE0197F4-4DF5-4E28-8B21-1CA74B1952A3}" type="datetimeFigureOut">
               <a:rPr lang="en-US" smtClean="0"/>
-              <a:t>2/4/2022</a:t>
+              <a:t>2/12/2022</a:t>
             </a:fld>
             <a:endParaRPr lang="en-US"/>
           </a:p>
@@ -1955,7 +1960,7 @@
           <a:p>
             <a:fld id="{AE0197F4-4DF5-4E28-8B21-1CA74B1952A3}" type="datetimeFigureOut">
               <a:rPr lang="en-US" smtClean="0"/>
-              <a:t>2/4/2022</a:t>
+              <a:t>2/12/2022</a:t>
             </a:fld>
             <a:endParaRPr lang="en-US"/>
           </a:p>
@@ -2068,7 +2073,7 @@
           <a:p>
             <a:fld id="{AE0197F4-4DF5-4E28-8B21-1CA74B1952A3}" type="datetimeFigureOut">
               <a:rPr lang="en-US" smtClean="0"/>
-              <a:t>2/4/2022</a:t>
+              <a:t>2/12/2022</a:t>
             </a:fld>
             <a:endParaRPr lang="en-US"/>
           </a:p>
@@ -2379,7 +2384,7 @@
           <a:p>
             <a:fld id="{AE0197F4-4DF5-4E28-8B21-1CA74B1952A3}" type="datetimeFigureOut">
               <a:rPr lang="en-US" smtClean="0"/>
-              <a:t>2/4/2022</a:t>
+              <a:t>2/12/2022</a:t>
             </a:fld>
             <a:endParaRPr lang="en-US"/>
           </a:p>
@@ -2667,7 +2672,7 @@
           <a:p>
             <a:fld id="{AE0197F4-4DF5-4E28-8B21-1CA74B1952A3}" type="datetimeFigureOut">
               <a:rPr lang="en-US" smtClean="0"/>
-              <a:t>2/4/2022</a:t>
+              <a:t>2/12/2022</a:t>
             </a:fld>
             <a:endParaRPr lang="en-US"/>
           </a:p>
@@ -2908,7 +2913,7 @@
           <a:p>
             <a:fld id="{AE0197F4-4DF5-4E28-8B21-1CA74B1952A3}" type="datetimeFigureOut">
               <a:rPr lang="en-US" smtClean="0"/>
-              <a:t>2/4/2022</a:t>
+              <a:t>2/12/2022</a:t>
             </a:fld>
             <a:endParaRPr lang="en-US"/>
           </a:p>
@@ -3603,7 +3608,7 @@
         <p:spPr>
           <a:xfrm>
             <a:off x="4943985" y="1920863"/>
-            <a:ext cx="5379806" cy="369332"/>
+            <a:ext cx="4185954" cy="369332"/>
           </a:xfrm>
           <a:prstGeom prst="rect">
             <a:avLst/>
@@ -3623,7 +3628,7 @@
                 <a:effectLst/>
                 <a:latin typeface="Open Sans"/>
               </a:rPr>
-              <a:t>Faster and More Frequent Production Deployments</a:t>
+              <a:t>Deploy more, deploy fast to Production</a:t>
             </a:r>
             <a:endParaRPr lang="en-US" dirty="0"/>
           </a:p>
@@ -3644,7 +3649,7 @@
         <p:spPr>
           <a:xfrm>
             <a:off x="4935596" y="3898999"/>
-            <a:ext cx="4838184" cy="369332"/>
+            <a:ext cx="4229235" cy="369332"/>
           </a:xfrm>
           <a:prstGeom prst="rect">
             <a:avLst/>
@@ -3664,7 +3669,7 @@
                 <a:effectLst/>
                 <a:latin typeface="Open Sans"/>
               </a:rPr>
-              <a:t>Deploy to Production Without Manual Checks</a:t>
+              <a:t>No more manual check when deploying</a:t>
             </a:r>
             <a:endParaRPr lang="en-US" dirty="0"/>
           </a:p>
@@ -3685,7 +3690,7 @@
         <p:spPr>
           <a:xfrm>
             <a:off x="4935596" y="2522988"/>
-            <a:ext cx="5976573" cy="369332"/>
+            <a:ext cx="6200095" cy="369332"/>
           </a:xfrm>
           <a:prstGeom prst="rect">
             <a:avLst/>
@@ -3705,7 +3710,7 @@
                 <a:effectLst/>
                 <a:latin typeface="Open Sans"/>
               </a:rPr>
-              <a:t>New value-generating features released more quickly</a:t>
+              <a:t>Generate more value quickly releasing the new features</a:t>
             </a:r>
             <a:endParaRPr lang="en-US" b="1" dirty="0"/>
           </a:p>
@@ -3726,7 +3731,7 @@
         <p:spPr>
           <a:xfrm>
             <a:off x="4953516" y="4501124"/>
-            <a:ext cx="2312493" cy="369332"/>
+            <a:ext cx="3783856" cy="369332"/>
           </a:xfrm>
           <a:prstGeom prst="rect">
             <a:avLst/>
@@ -3746,7 +3751,7 @@
                 <a:effectLst/>
                 <a:latin typeface="Open Sans"/>
               </a:rPr>
-              <a:t>Less time to market</a:t>
+              <a:t>Decrease features time to market</a:t>
             </a:r>
             <a:endParaRPr lang="en-US" b="1" dirty="0"/>
           </a:p>
@@ -3922,7 +3927,7 @@
         <p:spPr>
           <a:xfrm>
             <a:off x="4947442" y="2038906"/>
-            <a:ext cx="3603615" cy="369332"/>
+            <a:ext cx="3804631" cy="369332"/>
           </a:xfrm>
           <a:prstGeom prst="rect">
             <a:avLst/>
@@ -3942,7 +3947,7 @@
                 <a:effectLst/>
                 <a:latin typeface="Open Sans"/>
               </a:rPr>
-              <a:t>Catch Compile Errors After Merge</a:t>
+              <a:t>Quickly catch and fix compile errors</a:t>
             </a:r>
             <a:endParaRPr lang="en-US" dirty="0"/>
           </a:p>
@@ -3963,7 +3968,7 @@
         <p:spPr>
           <a:xfrm>
             <a:off x="4947442" y="2531042"/>
-            <a:ext cx="6211380" cy="369332"/>
+            <a:ext cx="3908442" cy="369332"/>
           </a:xfrm>
           <a:prstGeom prst="rect">
             <a:avLst/>
@@ -3983,7 +3988,7 @@
                 <a:effectLst/>
                 <a:latin typeface="Open Sans"/>
               </a:rPr>
-              <a:t>Less developer time on issues from new developer code</a:t>
+              <a:t>Spend less time on new code bugs</a:t>
             </a:r>
             <a:endParaRPr lang="en-US" b="1" dirty="0"/>
           </a:p>
@@ -4110,7 +4115,7 @@
         <p:spPr>
           <a:xfrm>
             <a:off x="4997102" y="3850391"/>
-            <a:ext cx="3504293" cy="369332"/>
+            <a:ext cx="5145126" cy="369332"/>
           </a:xfrm>
           <a:prstGeom prst="rect">
             <a:avLst/>
@@ -4130,7 +4135,7 @@
                 <a:effectLst/>
                 <a:latin typeface="Open Sans"/>
               </a:rPr>
-              <a:t>Automate Infrastructure Cleanup</a:t>
+              <a:t>Cleanup automatically infrastructure after deploy</a:t>
             </a:r>
             <a:endParaRPr lang="en-US" dirty="0"/>
           </a:p>
@@ -4151,7 +4156,7 @@
         <p:spPr>
           <a:xfrm>
             <a:off x="4997102" y="4438722"/>
-            <a:ext cx="5322611" cy="369332"/>
+            <a:ext cx="6778074" cy="369332"/>
           </a:xfrm>
           <a:prstGeom prst="rect">
             <a:avLst/>
@@ -4171,7 +4176,7 @@
                 <a:effectLst/>
                 <a:latin typeface="Open Sans"/>
               </a:rPr>
-              <a:t>Less infrastructure costs from unused resources</a:t>
+              <a:t>Reduce infrastructure costs by deleting the unused resources</a:t>
             </a:r>
             <a:endParaRPr lang="en-US" b="1" dirty="0"/>
           </a:p>
@@ -4317,7 +4322,7 @@
         <p:spPr>
           <a:xfrm>
             <a:off x="4933500" y="1348423"/>
-            <a:ext cx="2627707" cy="369332"/>
+            <a:ext cx="3009670" cy="369332"/>
           </a:xfrm>
           <a:prstGeom prst="rect">
             <a:avLst/>
@@ -4337,7 +4342,7 @@
                 <a:effectLst/>
                 <a:latin typeface="Open Sans"/>
               </a:rPr>
-              <a:t>Automated Smoke Tests</a:t>
+              <a:t>Automate your Smoke Tests</a:t>
             </a:r>
             <a:endParaRPr lang="en-US" dirty="0"/>
           </a:p>
@@ -4358,7 +4363,7 @@
         <p:spPr>
           <a:xfrm>
             <a:off x="4950277" y="2082378"/>
-            <a:ext cx="6552823" cy="646331"/>
+            <a:ext cx="6552823" cy="369332"/>
           </a:xfrm>
           <a:prstGeom prst="rect">
             <a:avLst/>
@@ -4378,7 +4383,7 @@
                 <a:effectLst/>
                 <a:latin typeface="Open Sans"/>
               </a:rPr>
-              <a:t>Reduced downtime from a deploy-related crash or major bug</a:t>
+              <a:t>Prevent crashes after deployments</a:t>
             </a:r>
             <a:endParaRPr lang="en-US" b="1" dirty="0"/>
           </a:p>
@@ -4399,7 +4404,7 @@
         <p:spPr>
           <a:xfrm>
             <a:off x="4947161" y="3739676"/>
-            <a:ext cx="4711674" cy="369332"/>
+            <a:ext cx="3865674" cy="369332"/>
           </a:xfrm>
           <a:prstGeom prst="rect">
             <a:avLst/>
@@ -4419,7 +4424,7 @@
                 <a:effectLst/>
                 <a:latin typeface="Open Sans"/>
               </a:rPr>
-              <a:t>Automated Rollback Triggered by Job Failure</a:t>
+              <a:t>Rollback automatically after Jobs fail</a:t>
             </a:r>
             <a:endParaRPr lang="en-US" dirty="0"/>
           </a:p>
@@ -4470,7 +4475,7 @@
         <p:spPr>
           <a:xfrm>
             <a:off x="4921994" y="4337156"/>
-            <a:ext cx="5577040" cy="369332"/>
+            <a:ext cx="3799053" cy="369332"/>
           </a:xfrm>
           <a:prstGeom prst="rect">
             <a:avLst/>
@@ -4490,7 +4495,7 @@
                 <a:effectLst/>
                 <a:latin typeface="Open Sans"/>
               </a:rPr>
-              <a:t>Quick undo to return production to working state</a:t>
+              <a:t>Revert your changes if checks fail</a:t>
             </a:r>
             <a:endParaRPr lang="en-US" b="1" dirty="0"/>
           </a:p>
@@ -4576,7 +4581,7 @@
         <p:spPr>
           <a:xfrm>
             <a:off x="4935873" y="1887679"/>
-            <a:ext cx="2518703" cy="369332"/>
+            <a:ext cx="3015634" cy="369332"/>
           </a:xfrm>
           <a:prstGeom prst="rect">
             <a:avLst/>
@@ -4596,7 +4601,7 @@
                 <a:effectLst/>
                 <a:latin typeface="Open Sans"/>
               </a:rPr>
-              <a:t>Catch Unit Test Failures</a:t>
+              <a:t>Automatically run Unit Tests</a:t>
             </a:r>
             <a:endParaRPr lang="en-US" dirty="0"/>
           </a:p>
@@ -4647,7 +4652,7 @@
         <p:spPr>
           <a:xfrm>
             <a:off x="4951326" y="2558690"/>
-            <a:ext cx="5325304" cy="369332"/>
+            <a:ext cx="5196359" cy="646331"/>
           </a:xfrm>
           <a:prstGeom prst="rect">
             <a:avLst/>
@@ -4667,7 +4672,19 @@
                 <a:effectLst/>
                 <a:latin typeface="Open Sans"/>
               </a:rPr>
-              <a:t>Less bugs in production and less time in testing</a:t>
+              <a:t>Deploy less code with bugs in production and </a:t>
+            </a:r>
+          </a:p>
+          <a:p>
+            <a:r>
+              <a:rPr lang="en-US" b="1" i="0" dirty="0">
+                <a:solidFill>
+                  <a:srgbClr val="4F4F4F"/>
+                </a:solidFill>
+                <a:effectLst/>
+                <a:latin typeface="Open Sans"/>
+              </a:rPr>
+              <a:t>reduce testing time</a:t>
             </a:r>
             <a:endParaRPr lang="en-US" b="1" dirty="0"/>
           </a:p>
@@ -4688,7 +4705,7 @@
         <p:spPr>
           <a:xfrm>
             <a:off x="4951326" y="3999343"/>
-            <a:ext cx="3207160" cy="369332"/>
+            <a:ext cx="4273991" cy="369332"/>
           </a:xfrm>
           <a:prstGeom prst="rect">
             <a:avLst/>
@@ -4708,7 +4725,7 @@
                 <a:effectLst/>
                 <a:latin typeface="Open Sans"/>
               </a:rPr>
-              <a:t>Detect Security Vulnerabilities</a:t>
+              <a:t>Check for Vulnerabilities in your projects</a:t>
             </a:r>
             <a:endParaRPr lang="en-US" dirty="0"/>
           </a:p>
@@ -4759,7 +4776,7 @@
         <p:spPr>
           <a:xfrm>
             <a:off x="4951326" y="4530367"/>
-            <a:ext cx="5078954" cy="369332"/>
+            <a:ext cx="3972562" cy="369332"/>
           </a:xfrm>
           <a:prstGeom prst="rect">
             <a:avLst/>
@@ -4779,7 +4796,7 @@
                 <a:effectLst/>
                 <a:latin typeface="Open Sans"/>
               </a:rPr>
-              <a:t>Prevent embarrassing or costly security holes</a:t>
+              <a:t>Avoid security issues and PR stunts</a:t>
             </a:r>
             <a:endParaRPr lang="en-US" b="1" dirty="0"/>
           </a:p>

</xml_diff>